<commit_message>
Color and caption font changed
</commit_message>
<xml_diff>
--- a/Montage.pptx
+++ b/Montage.pptx
@@ -104,6 +104,11 @@
       </a:defRPr>
     </a:lvl9pPr>
   </p:defaultTextStyle>
+  <p:extLst>
+    <p:ext uri="{EFAFB233-063F-42B5-8137-9DF3F51BA10A}">
+      <p15:sldGuideLst xmlns:p15="http://schemas.microsoft.com/office/powerpoint/2012/main"/>
+    </p:ext>
+  </p:extLst>
 </p:presentation>
 </file>
 
@@ -324,7 +329,7 @@
           <a:p>
             <a:fld id="{C4259C42-A359-EF45-BE3C-1DFDE182F8F4}" type="datetimeFigureOut">
               <a:rPr lang="en-US" smtClean="0"/>
-              <a:t>6/9/24</a:t>
+              <a:t>6/16/24</a:t>
             </a:fld>
             <a:endParaRPr lang="en-US"/>
           </a:p>
@@ -659,7 +664,7 @@
           <a:p>
             <a:fld id="{C4259C42-A359-EF45-BE3C-1DFDE182F8F4}" type="datetimeFigureOut">
               <a:rPr lang="en-US" smtClean="0"/>
-              <a:t>6/9/24</a:t>
+              <a:t>6/16/24</a:t>
             </a:fld>
             <a:endParaRPr lang="en-US"/>
           </a:p>
@@ -962,7 +967,7 @@
           <a:p>
             <a:fld id="{C4259C42-A359-EF45-BE3C-1DFDE182F8F4}" type="datetimeFigureOut">
               <a:rPr lang="en-US" smtClean="0"/>
-              <a:t>6/9/24</a:t>
+              <a:t>6/16/24</a:t>
             </a:fld>
             <a:endParaRPr lang="en-US"/>
           </a:p>
@@ -1210,7 +1215,7 @@
           <a:p>
             <a:fld id="{C4259C42-A359-EF45-BE3C-1DFDE182F8F4}" type="datetimeFigureOut">
               <a:rPr lang="en-US" smtClean="0"/>
-              <a:t>6/9/24</a:t>
+              <a:t>6/16/24</a:t>
             </a:fld>
             <a:endParaRPr lang="en-US"/>
           </a:p>
@@ -1618,7 +1623,7 @@
           <a:p>
             <a:fld id="{C4259C42-A359-EF45-BE3C-1DFDE182F8F4}" type="datetimeFigureOut">
               <a:rPr lang="en-US" smtClean="0"/>
-              <a:t>6/9/24</a:t>
+              <a:t>6/16/24</a:t>
             </a:fld>
             <a:endParaRPr lang="en-US"/>
           </a:p>
@@ -1933,7 +1938,7 @@
           <a:p>
             <a:fld id="{C4259C42-A359-EF45-BE3C-1DFDE182F8F4}" type="datetimeFigureOut">
               <a:rPr lang="en-US" smtClean="0"/>
-              <a:t>6/9/24</a:t>
+              <a:t>6/16/24</a:t>
             </a:fld>
             <a:endParaRPr lang="en-US"/>
           </a:p>
@@ -2478,7 +2483,7 @@
           <a:p>
             <a:fld id="{C4259C42-A359-EF45-BE3C-1DFDE182F8F4}" type="datetimeFigureOut">
               <a:rPr lang="en-US" smtClean="0"/>
-              <a:t>6/9/24</a:t>
+              <a:t>6/16/24</a:t>
             </a:fld>
             <a:endParaRPr lang="en-US"/>
           </a:p>
@@ -2674,7 +2679,7 @@
           <a:p>
             <a:fld id="{C4259C42-A359-EF45-BE3C-1DFDE182F8F4}" type="datetimeFigureOut">
               <a:rPr lang="en-US" smtClean="0"/>
-              <a:t>6/9/24</a:t>
+              <a:t>6/16/24</a:t>
             </a:fld>
             <a:endParaRPr lang="en-US"/>
           </a:p>
@@ -2888,7 +2893,7 @@
           <a:p>
             <a:fld id="{C4259C42-A359-EF45-BE3C-1DFDE182F8F4}" type="datetimeFigureOut">
               <a:rPr lang="en-US" smtClean="0"/>
-              <a:t>6/9/24</a:t>
+              <a:t>6/16/24</a:t>
             </a:fld>
             <a:endParaRPr lang="en-US"/>
           </a:p>
@@ -3258,7 +3263,7 @@
           <a:p>
             <a:fld id="{C4259C42-A359-EF45-BE3C-1DFDE182F8F4}" type="datetimeFigureOut">
               <a:rPr lang="en-US" smtClean="0"/>
-              <a:t>6/9/24</a:t>
+              <a:t>6/16/24</a:t>
             </a:fld>
             <a:endParaRPr lang="en-US"/>
           </a:p>
@@ -3662,7 +3667,7 @@
           <a:p>
             <a:fld id="{C4259C42-A359-EF45-BE3C-1DFDE182F8F4}" type="datetimeFigureOut">
               <a:rPr lang="en-US" smtClean="0"/>
-              <a:t>6/9/24</a:t>
+              <a:t>6/16/24</a:t>
             </a:fld>
             <a:endParaRPr lang="en-US"/>
           </a:p>
@@ -3974,7 +3979,7 @@
           <a:p>
             <a:fld id="{C4259C42-A359-EF45-BE3C-1DFDE182F8F4}" type="datetimeFigureOut">
               <a:rPr lang="en-US" smtClean="0"/>
-              <a:t>6/9/24</a:t>
+              <a:t>6/16/24</a:t>
             </a:fld>
             <a:endParaRPr lang="en-US"/>
           </a:p>
@@ -4519,7 +4524,7 @@
         </p:blipFill>
         <p:spPr>
           <a:xfrm>
-            <a:off x="975138" y="1946546"/>
+            <a:off x="975138" y="1610215"/>
             <a:ext cx="2610505" cy="2610505"/>
           </a:xfrm>
           <a:custGeom>
@@ -4580,7 +4585,7 @@
         </p:blipFill>
         <p:spPr>
           <a:xfrm>
-            <a:off x="3585646" y="1946544"/>
+            <a:off x="3586545" y="1515620"/>
             <a:ext cx="2610507" cy="2610507"/>
           </a:xfrm>
           <a:custGeom>
@@ -4641,7 +4646,7 @@
         </p:blipFill>
         <p:spPr>
           <a:xfrm>
-            <a:off x="6196155" y="1946543"/>
+            <a:off x="6196155" y="1562916"/>
             <a:ext cx="2610508" cy="2610508"/>
           </a:xfrm>
           <a:custGeom>
@@ -4702,7 +4707,7 @@
         </p:blipFill>
         <p:spPr>
           <a:xfrm>
-            <a:off x="8806663" y="1946543"/>
+            <a:off x="8806662" y="1515619"/>
             <a:ext cx="2610508" cy="2610508"/>
           </a:xfrm>
           <a:custGeom>
@@ -4757,7 +4762,7 @@
         <p:spPr>
           <a:xfrm>
             <a:off x="4720046" y="705394"/>
-            <a:ext cx="1810111" cy="707886"/>
+            <a:ext cx="2465740" cy="707886"/>
           </a:xfrm>
           <a:prstGeom prst="rect">
             <a:avLst/>
@@ -4772,11 +4777,73 @@
           <a:p>
             <a:r>
               <a:rPr lang="en-US" sz="4000" dirty="0"/>
-              <a:t>Gallery</a:t>
-            </a:r>
-          </a:p>
-        </p:txBody>
-      </p:sp>
+              <a:t>R-insights</a:t>
+            </a:r>
+          </a:p>
+        </p:txBody>
+      </p:sp>
+      <p:pic>
+        <p:nvPicPr>
+          <p:cNvPr id="3" name="Picture 2" descr="A chart of a recycle process&#10;&#10;Description automatically generated">
+            <a:extLst>
+              <a:ext uri="{FF2B5EF4-FFF2-40B4-BE49-F238E27FC236}">
+                <a16:creationId xmlns:a16="http://schemas.microsoft.com/office/drawing/2014/main" id="{AD6BF1AF-D0DC-40CA-B379-8B48DE8AD5CB}"/>
+              </a:ext>
+            </a:extLst>
+          </p:cNvPr>
+          <p:cNvPicPr>
+            <a:picLocks noChangeAspect="1"/>
+          </p:cNvPicPr>
+          <p:nvPr/>
+        </p:nvPicPr>
+        <p:blipFill>
+          <a:blip r:embed="rId6"/>
+          <a:stretch>
+            <a:fillRect/>
+          </a:stretch>
+        </p:blipFill>
+        <p:spPr>
+          <a:xfrm>
+            <a:off x="4720046" y="3996338"/>
+            <a:ext cx="2758832" cy="2597492"/>
+          </a:xfrm>
+          <a:custGeom>
+            <a:avLst/>
+            <a:gdLst/>
+            <a:ahLst/>
+            <a:cxnLst/>
+            <a:rect l="l" t="t" r="r" b="b"/>
+            <a:pathLst>
+              <a:path w="2849586" h="2849586">
+                <a:moveTo>
+                  <a:pt x="1424793" y="0"/>
+                </a:moveTo>
+                <a:cubicBezTo>
+                  <a:pt x="2211684" y="0"/>
+                  <a:pt x="2849586" y="637902"/>
+                  <a:pt x="2849586" y="1424793"/>
+                </a:cubicBezTo>
+                <a:cubicBezTo>
+                  <a:pt x="2849586" y="2211684"/>
+                  <a:pt x="2211684" y="2849586"/>
+                  <a:pt x="1424793" y="2849586"/>
+                </a:cubicBezTo>
+                <a:cubicBezTo>
+                  <a:pt x="637902" y="2849586"/>
+                  <a:pt x="0" y="2211684"/>
+                  <a:pt x="0" y="1424793"/>
+                </a:cubicBezTo>
+                <a:cubicBezTo>
+                  <a:pt x="0" y="637902"/>
+                  <a:pt x="637902" y="0"/>
+                  <a:pt x="1424793" y="0"/>
+                </a:cubicBezTo>
+                <a:close/>
+              </a:path>
+            </a:pathLst>
+          </a:custGeom>
+        </p:spPr>
+      </p:pic>
     </p:spTree>
     <p:extLst>
       <p:ext uri="{BB962C8B-B14F-4D97-AF65-F5344CB8AC3E}">

</xml_diff>